<commit_message>
excel to ppt initial
</commit_message>
<xml_diff>
--- a/tamil_biology/NEET_BIOLOGY_001.pptx
+++ b/tamil_biology/NEET_BIOLOGY_001.pptx
@@ -3163,27 +3163,28 @@
           <a:lstStyle/>
           <a:p>
             <a:r>
-              <a:t>குவான்டோசோம் இவற்றில் காணப்படுகிறது?</a:t>
-            </a:r>
-          </a:p>
-          <a:p>
-            <a:r>
-              <a:t>மைட்டோகாண்ட்ரியா</a:t>
-            </a:r>
-          </a:p>
-          <a:p>
-            <a:r>
-              <a:t>பசுங்கணிகம்</a:t>
-            </a:r>
-          </a:p>
-          <a:p>
-            <a:r>
-              <a:t>கோல்கை உடலங்கள்</a:t>
-            </a:r>
-          </a:p>
-          <a:p>
-            <a:r>
-              <a:t>எண்டோபிளாச வலை</a:t>
+              <a:t>Q - 7  குவான்டோசோம் இவற்றில் காணப்படுகிறது?</a:t>
+            </a:r>
+          </a:p>
+          <a:p/>
+          <a:p>
+            <a:r>
+              <a:t>அ) மைட்டோகாண்ட்ரியா</a:t>
+            </a:r>
+          </a:p>
+          <a:p>
+            <a:r>
+              <a:t>ஆ) பசுங்கணிகம்</a:t>
+            </a:r>
+          </a:p>
+          <a:p>
+            <a:r>
+              <a:t>இ) கோல்கை உடலங்கள்</a:t>
+            </a:r>
+          </a:p>
+          <a:p>
+            <a:r>
+              <a:t>ஈ) எண்டோபிளாச வலை</a:t>
             </a:r>
           </a:p>
         </p:txBody>

</xml_diff>

<commit_message>
excel to pdf basic working version
</commit_message>
<xml_diff>
--- a/tamil_biology/NEET_BIOLOGY_001.pptx
+++ b/tamil_biology/NEET_BIOLOGY_001.pptx
@@ -6,6 +6,15 @@
   </p:sldMasterIdLst>
   <p:sldIdLst>
     <p:sldId id="256" r:id="rId7"/>
+    <p:sldId id="257" r:id="rId8"/>
+    <p:sldId id="258" r:id="rId9"/>
+    <p:sldId id="259" r:id="rId10"/>
+    <p:sldId id="260" r:id="rId11"/>
+    <p:sldId id="261" r:id="rId12"/>
+    <p:sldId id="262" r:id="rId13"/>
+    <p:sldId id="263" r:id="rId14"/>
+    <p:sldId id="264" r:id="rId15"/>
+    <p:sldId id="265" r:id="rId16"/>
   </p:sldIdLst>
   <p:sldSz cx="9144000" cy="6858000" type="screen4x3"/>
   <p:notesSz cx="6858000" cy="9144000"/>
@@ -3132,10 +3141,10 @@
           <a:p>
             <a:pPr algn="ctr"/>
             <a:r>
-              <a:rPr sz="3200" b="1">
+              <a:rPr sz="2400" b="1">
                 <a:latin typeface="Calibri"/>
               </a:rPr>
-              <a:t>Lession 1 - Biology - 11th?</a:t>
+              <a:t>11th Std - Questions</a:t>
             </a:r>
           </a:p>
         </p:txBody>
@@ -3149,7 +3158,7 @@
         <p:spPr>
           <a:xfrm>
             <a:off x="457200" y="1371600"/>
-            <a:ext cx="8686800" cy="3657600"/>
+            <a:ext cx="7315200" cy="3657600"/>
           </a:xfrm>
           <a:prstGeom prst="rect">
             <a:avLst/>
@@ -3157,7 +3166,7 @@
           <a:noFill/>
         </p:spPr>
         <p:txBody>
-          <a:bodyPr wrap="none">
+          <a:bodyPr wrap="square">
             <a:spAutoFit/>
           </a:bodyPr>
           <a:lstStyle/>
@@ -3185,6 +3194,1002 @@
           <a:p>
             <a:r>
               <a:t>ஈ) எண்டோபிளாச வலை</a:t>
+            </a:r>
+          </a:p>
+        </p:txBody>
+      </p:sp>
+    </p:spTree>
+  </p:cSld>
+  <p:clrMapOvr>
+    <a:masterClrMapping/>
+  </p:clrMapOvr>
+</p:sld>
+</file>
+
+<file path=ppt/slides/slide10.xml><?xml version="1.0" encoding="utf-8"?>
+<p:sld xmlns:a="http://schemas.openxmlformats.org/drawingml/2006/main" xmlns:p="http://schemas.openxmlformats.org/presentationml/2006/main" xmlns:r="http://schemas.openxmlformats.org/officeDocument/2006/relationships">
+  <p:cSld>
+    <p:spTree>
+      <p:nvGrpSpPr>
+        <p:cNvPr id="1" name=""/>
+        <p:cNvGrpSpPr/>
+        <p:nvPr/>
+      </p:nvGrpSpPr>
+      <p:grpSpPr/>
+      <p:sp>
+        <p:nvSpPr>
+          <p:cNvPr id="2" name="Rectangle 1"/>
+          <p:cNvSpPr/>
+          <p:nvPr/>
+        </p:nvSpPr>
+        <p:spPr>
+          <a:xfrm>
+            <a:off x="0" y="457200"/>
+            <a:ext cx="9144000" cy="457200"/>
+          </a:xfrm>
+          <a:prstGeom prst="rect">
+            <a:avLst/>
+          </a:prstGeom>
+          <a:solidFill>
+            <a:srgbClr val="FF0000"/>
+          </a:solidFill>
+          <a:ln>
+            <a:solidFill>
+              <a:srgbClr val="FF0000"/>
+            </a:solidFill>
+          </a:ln>
+          <a:effectLst/>
+        </p:spPr>
+        <p:style>
+          <a:lnRef idx="1">
+            <a:schemeClr val="accent1"/>
+          </a:lnRef>
+          <a:fillRef idx="3">
+            <a:schemeClr val="accent1"/>
+          </a:fillRef>
+          <a:effectRef idx="2">
+            <a:schemeClr val="accent1"/>
+          </a:effectRef>
+          <a:fontRef idx="minor">
+            <a:schemeClr val="lt1"/>
+          </a:fontRef>
+        </p:style>
+        <p:txBody>
+          <a:bodyPr rtlCol="0" anchor="ctr"/>
+          <a:lstStyle/>
+          <a:p>
+            <a:pPr algn="ctr"/>
+            <a:r>
+              <a:rPr sz="2400" b="1">
+                <a:latin typeface="Calibri"/>
+              </a:rPr>
+              <a:t>11th Std - Questions</a:t>
+            </a:r>
+          </a:p>
+        </p:txBody>
+      </p:sp>
+      <p:sp>
+        <p:nvSpPr>
+          <p:cNvPr id="3" name="TextBox 2"/>
+          <p:cNvSpPr txBox="1"/>
+          <p:nvPr/>
+        </p:nvSpPr>
+        <p:spPr>
+          <a:xfrm>
+            <a:off x="457200" y="1371600"/>
+            <a:ext cx="7315200" cy="3657600"/>
+          </a:xfrm>
+          <a:prstGeom prst="rect">
+            <a:avLst/>
+          </a:prstGeom>
+          <a:noFill/>
+        </p:spPr>
+        <p:txBody>
+          <a:bodyPr wrap="square">
+            <a:spAutoFit/>
+          </a:bodyPr>
+          <a:lstStyle/>
+          <a:p>
+            <a:r>
+              <a:t>Q - 11  கோல்கை உடலங்கள் இதில் முக்கிய பங்காற்றுகின்றன?</a:t>
+            </a:r>
+          </a:p>
+          <a:p/>
+          <a:p>
+            <a:r>
+              <a:t>ஆ) புரதங்களை மொழிபெயர்த்தல்</a:t>
+            </a:r>
+          </a:p>
+        </p:txBody>
+      </p:sp>
+    </p:spTree>
+  </p:cSld>
+  <p:clrMapOvr>
+    <a:masterClrMapping/>
+  </p:clrMapOvr>
+</p:sld>
+</file>
+
+<file path=ppt/slides/slide2.xml><?xml version="1.0" encoding="utf-8"?>
+<p:sld xmlns:a="http://schemas.openxmlformats.org/drawingml/2006/main" xmlns:p="http://schemas.openxmlformats.org/presentationml/2006/main" xmlns:r="http://schemas.openxmlformats.org/officeDocument/2006/relationships">
+  <p:cSld>
+    <p:spTree>
+      <p:nvGrpSpPr>
+        <p:cNvPr id="1" name=""/>
+        <p:cNvGrpSpPr/>
+        <p:nvPr/>
+      </p:nvGrpSpPr>
+      <p:grpSpPr/>
+      <p:sp>
+        <p:nvSpPr>
+          <p:cNvPr id="2" name="Rectangle 1"/>
+          <p:cNvSpPr/>
+          <p:nvPr/>
+        </p:nvSpPr>
+        <p:spPr>
+          <a:xfrm>
+            <a:off x="0" y="457200"/>
+            <a:ext cx="9144000" cy="457200"/>
+          </a:xfrm>
+          <a:prstGeom prst="rect">
+            <a:avLst/>
+          </a:prstGeom>
+          <a:solidFill>
+            <a:srgbClr val="FF0000"/>
+          </a:solidFill>
+          <a:ln>
+            <a:solidFill>
+              <a:srgbClr val="FF0000"/>
+            </a:solidFill>
+          </a:ln>
+          <a:effectLst/>
+        </p:spPr>
+        <p:style>
+          <a:lnRef idx="1">
+            <a:schemeClr val="accent1"/>
+          </a:lnRef>
+          <a:fillRef idx="3">
+            <a:schemeClr val="accent1"/>
+          </a:fillRef>
+          <a:effectRef idx="2">
+            <a:schemeClr val="accent1"/>
+          </a:effectRef>
+          <a:fontRef idx="minor">
+            <a:schemeClr val="lt1"/>
+          </a:fontRef>
+        </p:style>
+        <p:txBody>
+          <a:bodyPr rtlCol="0" anchor="ctr"/>
+          <a:lstStyle/>
+          <a:p>
+            <a:pPr algn="ctr"/>
+            <a:r>
+              <a:rPr sz="2400" b="1">
+                <a:latin typeface="Calibri"/>
+              </a:rPr>
+              <a:t>11th Std - Questions</a:t>
+            </a:r>
+          </a:p>
+        </p:txBody>
+      </p:sp>
+      <p:sp>
+        <p:nvSpPr>
+          <p:cNvPr id="3" name="TextBox 2"/>
+          <p:cNvSpPr txBox="1"/>
+          <p:nvPr/>
+        </p:nvSpPr>
+        <p:spPr>
+          <a:xfrm>
+            <a:off x="457200" y="1371600"/>
+            <a:ext cx="7315200" cy="3657600"/>
+          </a:xfrm>
+          <a:prstGeom prst="rect">
+            <a:avLst/>
+          </a:prstGeom>
+          <a:noFill/>
+        </p:spPr>
+        <p:txBody>
+          <a:bodyPr wrap="square">
+            <a:spAutoFit/>
+          </a:bodyPr>
+          <a:lstStyle/>
+          <a:p>
+            <a:r>
+              <a:t>Q - 7  குவான்டோசோம் இவற்றில் காணப்படுகிறது?</a:t>
+            </a:r>
+          </a:p>
+          <a:p/>
+          <a:p>
+            <a:r>
+              <a:t>ஆ) பசுங்கணிகம்</a:t>
+            </a:r>
+          </a:p>
+        </p:txBody>
+      </p:sp>
+    </p:spTree>
+  </p:cSld>
+  <p:clrMapOvr>
+    <a:masterClrMapping/>
+  </p:clrMapOvr>
+</p:sld>
+</file>
+
+<file path=ppt/slides/slide3.xml><?xml version="1.0" encoding="utf-8"?>
+<p:sld xmlns:a="http://schemas.openxmlformats.org/drawingml/2006/main" xmlns:p="http://schemas.openxmlformats.org/presentationml/2006/main" xmlns:r="http://schemas.openxmlformats.org/officeDocument/2006/relationships">
+  <p:cSld>
+    <p:spTree>
+      <p:nvGrpSpPr>
+        <p:cNvPr id="1" name=""/>
+        <p:cNvGrpSpPr/>
+        <p:nvPr/>
+      </p:nvGrpSpPr>
+      <p:grpSpPr/>
+      <p:sp>
+        <p:nvSpPr>
+          <p:cNvPr id="2" name="Rectangle 1"/>
+          <p:cNvSpPr/>
+          <p:nvPr/>
+        </p:nvSpPr>
+        <p:spPr>
+          <a:xfrm>
+            <a:off x="0" y="457200"/>
+            <a:ext cx="9144000" cy="457200"/>
+          </a:xfrm>
+          <a:prstGeom prst="rect">
+            <a:avLst/>
+          </a:prstGeom>
+          <a:solidFill>
+            <a:srgbClr val="FF0000"/>
+          </a:solidFill>
+          <a:ln>
+            <a:solidFill>
+              <a:srgbClr val="FF0000"/>
+            </a:solidFill>
+          </a:ln>
+          <a:effectLst/>
+        </p:spPr>
+        <p:style>
+          <a:lnRef idx="1">
+            <a:schemeClr val="accent1"/>
+          </a:lnRef>
+          <a:fillRef idx="3">
+            <a:schemeClr val="accent1"/>
+          </a:fillRef>
+          <a:effectRef idx="2">
+            <a:schemeClr val="accent1"/>
+          </a:effectRef>
+          <a:fontRef idx="minor">
+            <a:schemeClr val="lt1"/>
+          </a:fontRef>
+        </p:style>
+        <p:txBody>
+          <a:bodyPr rtlCol="0" anchor="ctr"/>
+          <a:lstStyle/>
+          <a:p>
+            <a:pPr algn="ctr"/>
+            <a:r>
+              <a:rPr sz="2400" b="1">
+                <a:latin typeface="Calibri"/>
+              </a:rPr>
+              <a:t>11th Std - Questions</a:t>
+            </a:r>
+          </a:p>
+        </p:txBody>
+      </p:sp>
+      <p:sp>
+        <p:nvSpPr>
+          <p:cNvPr id="3" name="TextBox 2"/>
+          <p:cNvSpPr txBox="1"/>
+          <p:nvPr/>
+        </p:nvSpPr>
+        <p:spPr>
+          <a:xfrm>
+            <a:off x="457200" y="1371600"/>
+            <a:ext cx="7315200" cy="3657600"/>
+          </a:xfrm>
+          <a:prstGeom prst="rect">
+            <a:avLst/>
+          </a:prstGeom>
+          <a:noFill/>
+        </p:spPr>
+        <p:txBody>
+          <a:bodyPr wrap="square">
+            <a:spAutoFit/>
+          </a:bodyPr>
+          <a:lstStyle/>
+          <a:p>
+            <a:r>
+              <a:t>Q - 8  சைட்டோகுரோம் ஆக்ஸிடேஸ் என்ற நொதி மைட்டோகாண்டிரியாவில் காணப்படும் இடம்?</a:t>
+            </a:r>
+          </a:p>
+          <a:p/>
+          <a:p>
+            <a:r>
+              <a:t>அ) மைட்டோகாண்டிரியாவின் வெளிச்சவ்வு</a:t>
+            </a:r>
+          </a:p>
+          <a:p>
+            <a:r>
+              <a:t>ஆ) மைட்டோகாண்டிரியாவின் உட்சவ்வு </a:t>
+            </a:r>
+          </a:p>
+          <a:p>
+            <a:r>
+              <a:t>இ) ஸ்ட்ரோமா </a:t>
+            </a:r>
+          </a:p>
+          <a:p>
+            <a:r>
+              <a:t>ஈ) கிரானம் </a:t>
+            </a:r>
+          </a:p>
+        </p:txBody>
+      </p:sp>
+    </p:spTree>
+  </p:cSld>
+  <p:clrMapOvr>
+    <a:masterClrMapping/>
+  </p:clrMapOvr>
+</p:sld>
+</file>
+
+<file path=ppt/slides/slide4.xml><?xml version="1.0" encoding="utf-8"?>
+<p:sld xmlns:a="http://schemas.openxmlformats.org/drawingml/2006/main" xmlns:p="http://schemas.openxmlformats.org/presentationml/2006/main" xmlns:r="http://schemas.openxmlformats.org/officeDocument/2006/relationships">
+  <p:cSld>
+    <p:spTree>
+      <p:nvGrpSpPr>
+        <p:cNvPr id="1" name=""/>
+        <p:cNvGrpSpPr/>
+        <p:nvPr/>
+      </p:nvGrpSpPr>
+      <p:grpSpPr/>
+      <p:sp>
+        <p:nvSpPr>
+          <p:cNvPr id="2" name="Rectangle 1"/>
+          <p:cNvSpPr/>
+          <p:nvPr/>
+        </p:nvSpPr>
+        <p:spPr>
+          <a:xfrm>
+            <a:off x="0" y="457200"/>
+            <a:ext cx="9144000" cy="457200"/>
+          </a:xfrm>
+          <a:prstGeom prst="rect">
+            <a:avLst/>
+          </a:prstGeom>
+          <a:solidFill>
+            <a:srgbClr val="FF0000"/>
+          </a:solidFill>
+          <a:ln>
+            <a:solidFill>
+              <a:srgbClr val="FF0000"/>
+            </a:solidFill>
+          </a:ln>
+          <a:effectLst/>
+        </p:spPr>
+        <p:style>
+          <a:lnRef idx="1">
+            <a:schemeClr val="accent1"/>
+          </a:lnRef>
+          <a:fillRef idx="3">
+            <a:schemeClr val="accent1"/>
+          </a:fillRef>
+          <a:effectRef idx="2">
+            <a:schemeClr val="accent1"/>
+          </a:effectRef>
+          <a:fontRef idx="minor">
+            <a:schemeClr val="lt1"/>
+          </a:fontRef>
+        </p:style>
+        <p:txBody>
+          <a:bodyPr rtlCol="0" anchor="ctr"/>
+          <a:lstStyle/>
+          <a:p>
+            <a:pPr algn="ctr"/>
+            <a:r>
+              <a:rPr sz="2400" b="1">
+                <a:latin typeface="Calibri"/>
+              </a:rPr>
+              <a:t>11th Std - Questions</a:t>
+            </a:r>
+          </a:p>
+        </p:txBody>
+      </p:sp>
+      <p:sp>
+        <p:nvSpPr>
+          <p:cNvPr id="3" name="TextBox 2"/>
+          <p:cNvSpPr txBox="1"/>
+          <p:nvPr/>
+        </p:nvSpPr>
+        <p:spPr>
+          <a:xfrm>
+            <a:off x="457200" y="1371600"/>
+            <a:ext cx="7315200" cy="3657600"/>
+          </a:xfrm>
+          <a:prstGeom prst="rect">
+            <a:avLst/>
+          </a:prstGeom>
+          <a:noFill/>
+        </p:spPr>
+        <p:txBody>
+          <a:bodyPr wrap="square">
+            <a:spAutoFit/>
+          </a:bodyPr>
+          <a:lstStyle/>
+          <a:p>
+            <a:r>
+              <a:t>Q - 8  சைட்டோகுரோம் ஆக்ஸிடேஸ் என்ற நொதி மைட்டோகாண்டிரியாவில் காணப்படும் இடம்?</a:t>
+            </a:r>
+          </a:p>
+          <a:p/>
+          <a:p>
+            <a:r>
+              <a:t>ஆ) மைட்டோகாண்டிரியாவின் உட்சவ்வு </a:t>
+            </a:r>
+          </a:p>
+        </p:txBody>
+      </p:sp>
+    </p:spTree>
+  </p:cSld>
+  <p:clrMapOvr>
+    <a:masterClrMapping/>
+  </p:clrMapOvr>
+</p:sld>
+</file>
+
+<file path=ppt/slides/slide5.xml><?xml version="1.0" encoding="utf-8"?>
+<p:sld xmlns:a="http://schemas.openxmlformats.org/drawingml/2006/main" xmlns:p="http://schemas.openxmlformats.org/presentationml/2006/main" xmlns:r="http://schemas.openxmlformats.org/officeDocument/2006/relationships">
+  <p:cSld>
+    <p:spTree>
+      <p:nvGrpSpPr>
+        <p:cNvPr id="1" name=""/>
+        <p:cNvGrpSpPr/>
+        <p:nvPr/>
+      </p:nvGrpSpPr>
+      <p:grpSpPr/>
+      <p:sp>
+        <p:nvSpPr>
+          <p:cNvPr id="2" name="Rectangle 1"/>
+          <p:cNvSpPr/>
+          <p:nvPr/>
+        </p:nvSpPr>
+        <p:spPr>
+          <a:xfrm>
+            <a:off x="0" y="457200"/>
+            <a:ext cx="9144000" cy="457200"/>
+          </a:xfrm>
+          <a:prstGeom prst="rect">
+            <a:avLst/>
+          </a:prstGeom>
+          <a:solidFill>
+            <a:srgbClr val="FF0000"/>
+          </a:solidFill>
+          <a:ln>
+            <a:solidFill>
+              <a:srgbClr val="FF0000"/>
+            </a:solidFill>
+          </a:ln>
+          <a:effectLst/>
+        </p:spPr>
+        <p:style>
+          <a:lnRef idx="1">
+            <a:schemeClr val="accent1"/>
+          </a:lnRef>
+          <a:fillRef idx="3">
+            <a:schemeClr val="accent1"/>
+          </a:fillRef>
+          <a:effectRef idx="2">
+            <a:schemeClr val="accent1"/>
+          </a:effectRef>
+          <a:fontRef idx="minor">
+            <a:schemeClr val="lt1"/>
+          </a:fontRef>
+        </p:style>
+        <p:txBody>
+          <a:bodyPr rtlCol="0" anchor="ctr"/>
+          <a:lstStyle/>
+          <a:p>
+            <a:pPr algn="ctr"/>
+            <a:r>
+              <a:rPr sz="2400" b="1">
+                <a:latin typeface="Calibri"/>
+              </a:rPr>
+              <a:t>11th Std - Questions</a:t>
+            </a:r>
+          </a:p>
+        </p:txBody>
+      </p:sp>
+      <p:sp>
+        <p:nvSpPr>
+          <p:cNvPr id="3" name="TextBox 2"/>
+          <p:cNvSpPr txBox="1"/>
+          <p:nvPr/>
+        </p:nvSpPr>
+        <p:spPr>
+          <a:xfrm>
+            <a:off x="457200" y="1371600"/>
+            <a:ext cx="7315200" cy="3657600"/>
+          </a:xfrm>
+          <a:prstGeom prst="rect">
+            <a:avLst/>
+          </a:prstGeom>
+          <a:noFill/>
+        </p:spPr>
+        <p:txBody>
+          <a:bodyPr wrap="square">
+            <a:spAutoFit/>
+          </a:bodyPr>
+          <a:lstStyle/>
+          <a:p>
+            <a:r>
+              <a:t>Q - 9  சுரக்கும் செல்கள் அதிகளவில் காணக்கூடிய செல் நுண்ணுறுப்பு எது?</a:t>
+            </a:r>
+          </a:p>
+          <a:p/>
+          <a:p>
+            <a:r>
+              <a:t>அ) மைட்டோகாண்ட்ரியா</a:t>
+            </a:r>
+          </a:p>
+          <a:p>
+            <a:r>
+              <a:t>ஆ) பசுங்கணிகம்</a:t>
+            </a:r>
+          </a:p>
+          <a:p>
+            <a:r>
+              <a:t>இ) உட்கரு</a:t>
+            </a:r>
+          </a:p>
+          <a:p>
+            <a:r>
+              <a:t>ஈ) டிக்டியோசோம்கள் </a:t>
+            </a:r>
+          </a:p>
+        </p:txBody>
+      </p:sp>
+    </p:spTree>
+  </p:cSld>
+  <p:clrMapOvr>
+    <a:masterClrMapping/>
+  </p:clrMapOvr>
+</p:sld>
+</file>
+
+<file path=ppt/slides/slide6.xml><?xml version="1.0" encoding="utf-8"?>
+<p:sld xmlns:a="http://schemas.openxmlformats.org/drawingml/2006/main" xmlns:p="http://schemas.openxmlformats.org/presentationml/2006/main" xmlns:r="http://schemas.openxmlformats.org/officeDocument/2006/relationships">
+  <p:cSld>
+    <p:spTree>
+      <p:nvGrpSpPr>
+        <p:cNvPr id="1" name=""/>
+        <p:cNvGrpSpPr/>
+        <p:nvPr/>
+      </p:nvGrpSpPr>
+      <p:grpSpPr/>
+      <p:sp>
+        <p:nvSpPr>
+          <p:cNvPr id="2" name="Rectangle 1"/>
+          <p:cNvSpPr/>
+          <p:nvPr/>
+        </p:nvSpPr>
+        <p:spPr>
+          <a:xfrm>
+            <a:off x="0" y="457200"/>
+            <a:ext cx="9144000" cy="457200"/>
+          </a:xfrm>
+          <a:prstGeom prst="rect">
+            <a:avLst/>
+          </a:prstGeom>
+          <a:solidFill>
+            <a:srgbClr val="FF0000"/>
+          </a:solidFill>
+          <a:ln>
+            <a:solidFill>
+              <a:srgbClr val="FF0000"/>
+            </a:solidFill>
+          </a:ln>
+          <a:effectLst/>
+        </p:spPr>
+        <p:style>
+          <a:lnRef idx="1">
+            <a:schemeClr val="accent1"/>
+          </a:lnRef>
+          <a:fillRef idx="3">
+            <a:schemeClr val="accent1"/>
+          </a:fillRef>
+          <a:effectRef idx="2">
+            <a:schemeClr val="accent1"/>
+          </a:effectRef>
+          <a:fontRef idx="minor">
+            <a:schemeClr val="lt1"/>
+          </a:fontRef>
+        </p:style>
+        <p:txBody>
+          <a:bodyPr rtlCol="0" anchor="ctr"/>
+          <a:lstStyle/>
+          <a:p>
+            <a:pPr algn="ctr"/>
+            <a:r>
+              <a:rPr sz="2400" b="1">
+                <a:latin typeface="Calibri"/>
+              </a:rPr>
+              <a:t>11th Std - Questions</a:t>
+            </a:r>
+          </a:p>
+        </p:txBody>
+      </p:sp>
+      <p:sp>
+        <p:nvSpPr>
+          <p:cNvPr id="3" name="TextBox 2"/>
+          <p:cNvSpPr txBox="1"/>
+          <p:nvPr/>
+        </p:nvSpPr>
+        <p:spPr>
+          <a:xfrm>
+            <a:off x="457200" y="1371600"/>
+            <a:ext cx="7315200" cy="3657600"/>
+          </a:xfrm>
+          <a:prstGeom prst="rect">
+            <a:avLst/>
+          </a:prstGeom>
+          <a:noFill/>
+        </p:spPr>
+        <p:txBody>
+          <a:bodyPr wrap="square">
+            <a:spAutoFit/>
+          </a:bodyPr>
+          <a:lstStyle/>
+          <a:p>
+            <a:r>
+              <a:t>Q - 9  சுரக்கும் செல்கள் அதிகளவில் காணக்கூடிய செல் நுண்ணுறுப்பு எது?</a:t>
+            </a:r>
+          </a:p>
+          <a:p/>
+          <a:p>
+            <a:r>
+              <a:t>ஈ) டிக்டியோசோம்கள் </a:t>
+            </a:r>
+          </a:p>
+        </p:txBody>
+      </p:sp>
+    </p:spTree>
+  </p:cSld>
+  <p:clrMapOvr>
+    <a:masterClrMapping/>
+  </p:clrMapOvr>
+</p:sld>
+</file>
+
+<file path=ppt/slides/slide7.xml><?xml version="1.0" encoding="utf-8"?>
+<p:sld xmlns:a="http://schemas.openxmlformats.org/drawingml/2006/main" xmlns:p="http://schemas.openxmlformats.org/presentationml/2006/main" xmlns:r="http://schemas.openxmlformats.org/officeDocument/2006/relationships">
+  <p:cSld>
+    <p:spTree>
+      <p:nvGrpSpPr>
+        <p:cNvPr id="1" name=""/>
+        <p:cNvGrpSpPr/>
+        <p:nvPr/>
+      </p:nvGrpSpPr>
+      <p:grpSpPr/>
+      <p:sp>
+        <p:nvSpPr>
+          <p:cNvPr id="2" name="Rectangle 1"/>
+          <p:cNvSpPr/>
+          <p:nvPr/>
+        </p:nvSpPr>
+        <p:spPr>
+          <a:xfrm>
+            <a:off x="0" y="457200"/>
+            <a:ext cx="9144000" cy="457200"/>
+          </a:xfrm>
+          <a:prstGeom prst="rect">
+            <a:avLst/>
+          </a:prstGeom>
+          <a:solidFill>
+            <a:srgbClr val="FF0000"/>
+          </a:solidFill>
+          <a:ln>
+            <a:solidFill>
+              <a:srgbClr val="FF0000"/>
+            </a:solidFill>
+          </a:ln>
+          <a:effectLst/>
+        </p:spPr>
+        <p:style>
+          <a:lnRef idx="1">
+            <a:schemeClr val="accent1"/>
+          </a:lnRef>
+          <a:fillRef idx="3">
+            <a:schemeClr val="accent1"/>
+          </a:fillRef>
+          <a:effectRef idx="2">
+            <a:schemeClr val="accent1"/>
+          </a:effectRef>
+          <a:fontRef idx="minor">
+            <a:schemeClr val="lt1"/>
+          </a:fontRef>
+        </p:style>
+        <p:txBody>
+          <a:bodyPr rtlCol="0" anchor="ctr"/>
+          <a:lstStyle/>
+          <a:p>
+            <a:pPr algn="ctr"/>
+            <a:r>
+              <a:rPr sz="2400" b="1">
+                <a:latin typeface="Calibri"/>
+              </a:rPr>
+              <a:t>11th Std - Questions</a:t>
+            </a:r>
+          </a:p>
+        </p:txBody>
+      </p:sp>
+      <p:sp>
+        <p:nvSpPr>
+          <p:cNvPr id="3" name="TextBox 2"/>
+          <p:cNvSpPr txBox="1"/>
+          <p:nvPr/>
+        </p:nvSpPr>
+        <p:spPr>
+          <a:xfrm>
+            <a:off x="457200" y="1371600"/>
+            <a:ext cx="7315200" cy="3657600"/>
+          </a:xfrm>
+          <a:prstGeom prst="rect">
+            <a:avLst/>
+          </a:prstGeom>
+          <a:noFill/>
+        </p:spPr>
+        <p:txBody>
+          <a:bodyPr wrap="square">
+            <a:spAutoFit/>
+          </a:bodyPr>
+          <a:lstStyle/>
+          <a:p>
+            <a:r>
+              <a:t>Q - 10  லிப்பிடுகள் அதிகளவில் உற்பத்தியாகும் இடம்?</a:t>
+            </a:r>
+          </a:p>
+          <a:p/>
+          <a:p>
+            <a:r>
+              <a:t>அ) சொரசொரப்பான எண்டோபிளாச வலை </a:t>
+            </a:r>
+          </a:p>
+          <a:p>
+            <a:r>
+              <a:t>ஆ) வழவழப்பான  எண்டோபிளாச வலை </a:t>
+            </a:r>
+          </a:p>
+          <a:p>
+            <a:r>
+              <a:t>இ) சென்ட்ரியோல்</a:t>
+            </a:r>
+          </a:p>
+          <a:p>
+            <a:r>
+              <a:t>ஈ) லைசோசோம்</a:t>
+            </a:r>
+          </a:p>
+        </p:txBody>
+      </p:sp>
+    </p:spTree>
+  </p:cSld>
+  <p:clrMapOvr>
+    <a:masterClrMapping/>
+  </p:clrMapOvr>
+</p:sld>
+</file>
+
+<file path=ppt/slides/slide8.xml><?xml version="1.0" encoding="utf-8"?>
+<p:sld xmlns:a="http://schemas.openxmlformats.org/drawingml/2006/main" xmlns:p="http://schemas.openxmlformats.org/presentationml/2006/main" xmlns:r="http://schemas.openxmlformats.org/officeDocument/2006/relationships">
+  <p:cSld>
+    <p:spTree>
+      <p:nvGrpSpPr>
+        <p:cNvPr id="1" name=""/>
+        <p:cNvGrpSpPr/>
+        <p:nvPr/>
+      </p:nvGrpSpPr>
+      <p:grpSpPr/>
+      <p:sp>
+        <p:nvSpPr>
+          <p:cNvPr id="2" name="Rectangle 1"/>
+          <p:cNvSpPr/>
+          <p:nvPr/>
+        </p:nvSpPr>
+        <p:spPr>
+          <a:xfrm>
+            <a:off x="0" y="457200"/>
+            <a:ext cx="9144000" cy="457200"/>
+          </a:xfrm>
+          <a:prstGeom prst="rect">
+            <a:avLst/>
+          </a:prstGeom>
+          <a:solidFill>
+            <a:srgbClr val="FF0000"/>
+          </a:solidFill>
+          <a:ln>
+            <a:solidFill>
+              <a:srgbClr val="FF0000"/>
+            </a:solidFill>
+          </a:ln>
+          <a:effectLst/>
+        </p:spPr>
+        <p:style>
+          <a:lnRef idx="1">
+            <a:schemeClr val="accent1"/>
+          </a:lnRef>
+          <a:fillRef idx="3">
+            <a:schemeClr val="accent1"/>
+          </a:fillRef>
+          <a:effectRef idx="2">
+            <a:schemeClr val="accent1"/>
+          </a:effectRef>
+          <a:fontRef idx="minor">
+            <a:schemeClr val="lt1"/>
+          </a:fontRef>
+        </p:style>
+        <p:txBody>
+          <a:bodyPr rtlCol="0" anchor="ctr"/>
+          <a:lstStyle/>
+          <a:p>
+            <a:pPr algn="ctr"/>
+            <a:r>
+              <a:rPr sz="2400" b="1">
+                <a:latin typeface="Calibri"/>
+              </a:rPr>
+              <a:t>11th Std - Questions</a:t>
+            </a:r>
+          </a:p>
+        </p:txBody>
+      </p:sp>
+      <p:sp>
+        <p:nvSpPr>
+          <p:cNvPr id="3" name="TextBox 2"/>
+          <p:cNvSpPr txBox="1"/>
+          <p:nvPr/>
+        </p:nvSpPr>
+        <p:spPr>
+          <a:xfrm>
+            <a:off x="457200" y="1371600"/>
+            <a:ext cx="7315200" cy="3657600"/>
+          </a:xfrm>
+          <a:prstGeom prst="rect">
+            <a:avLst/>
+          </a:prstGeom>
+          <a:noFill/>
+        </p:spPr>
+        <p:txBody>
+          <a:bodyPr wrap="square">
+            <a:spAutoFit/>
+          </a:bodyPr>
+          <a:lstStyle/>
+          <a:p>
+            <a:r>
+              <a:t>Q - 10  லிப்பிடுகள் அதிகளவில் உற்பத்தியாகும் இடம்?</a:t>
+            </a:r>
+          </a:p>
+          <a:p/>
+          <a:p>
+            <a:r>
+              <a:t>ஆ) வழவழப்பான  எண்டோபிளாச வலை </a:t>
+            </a:r>
+          </a:p>
+        </p:txBody>
+      </p:sp>
+    </p:spTree>
+  </p:cSld>
+  <p:clrMapOvr>
+    <a:masterClrMapping/>
+  </p:clrMapOvr>
+</p:sld>
+</file>
+
+<file path=ppt/slides/slide9.xml><?xml version="1.0" encoding="utf-8"?>
+<p:sld xmlns:a="http://schemas.openxmlformats.org/drawingml/2006/main" xmlns:p="http://schemas.openxmlformats.org/presentationml/2006/main" xmlns:r="http://schemas.openxmlformats.org/officeDocument/2006/relationships">
+  <p:cSld>
+    <p:spTree>
+      <p:nvGrpSpPr>
+        <p:cNvPr id="1" name=""/>
+        <p:cNvGrpSpPr/>
+        <p:nvPr/>
+      </p:nvGrpSpPr>
+      <p:grpSpPr/>
+      <p:sp>
+        <p:nvSpPr>
+          <p:cNvPr id="2" name="Rectangle 1"/>
+          <p:cNvSpPr/>
+          <p:nvPr/>
+        </p:nvSpPr>
+        <p:spPr>
+          <a:xfrm>
+            <a:off x="0" y="457200"/>
+            <a:ext cx="9144000" cy="457200"/>
+          </a:xfrm>
+          <a:prstGeom prst="rect">
+            <a:avLst/>
+          </a:prstGeom>
+          <a:solidFill>
+            <a:srgbClr val="FF0000"/>
+          </a:solidFill>
+          <a:ln>
+            <a:solidFill>
+              <a:srgbClr val="FF0000"/>
+            </a:solidFill>
+          </a:ln>
+          <a:effectLst/>
+        </p:spPr>
+        <p:style>
+          <a:lnRef idx="1">
+            <a:schemeClr val="accent1"/>
+          </a:lnRef>
+          <a:fillRef idx="3">
+            <a:schemeClr val="accent1"/>
+          </a:fillRef>
+          <a:effectRef idx="2">
+            <a:schemeClr val="accent1"/>
+          </a:effectRef>
+          <a:fontRef idx="minor">
+            <a:schemeClr val="lt1"/>
+          </a:fontRef>
+        </p:style>
+        <p:txBody>
+          <a:bodyPr rtlCol="0" anchor="ctr"/>
+          <a:lstStyle/>
+          <a:p>
+            <a:pPr algn="ctr"/>
+            <a:r>
+              <a:rPr sz="2400" b="1">
+                <a:latin typeface="Calibri"/>
+              </a:rPr>
+              <a:t>11th Std - Questions</a:t>
+            </a:r>
+          </a:p>
+        </p:txBody>
+      </p:sp>
+      <p:sp>
+        <p:nvSpPr>
+          <p:cNvPr id="3" name="TextBox 2"/>
+          <p:cNvSpPr txBox="1"/>
+          <p:nvPr/>
+        </p:nvSpPr>
+        <p:spPr>
+          <a:xfrm>
+            <a:off x="457200" y="1371600"/>
+            <a:ext cx="7315200" cy="3657600"/>
+          </a:xfrm>
+          <a:prstGeom prst="rect">
+            <a:avLst/>
+          </a:prstGeom>
+          <a:noFill/>
+        </p:spPr>
+        <p:txBody>
+          <a:bodyPr wrap="square">
+            <a:spAutoFit/>
+          </a:bodyPr>
+          <a:lstStyle/>
+          <a:p>
+            <a:r>
+              <a:t>Q - 11  கோல்கை உடலங்கள் இதில் முக்கிய பங்காற்றுகின்றன?</a:t>
+            </a:r>
+          </a:p>
+          <a:p/>
+          <a:p>
+            <a:r>
+              <a:t>அ) புரதங்கள் மொழியாக்கத்திற்குப் பின்பு மாறுபாடு அடைதல் மற்றும் லிப்பிடுகளின் கிளைகோசிடேசன் </a:t>
+            </a:r>
+          </a:p>
+          <a:p>
+            <a:r>
+              <a:t>ஆ) புரதங்களை மொழிபெயர்த்தல்</a:t>
+            </a:r>
+          </a:p>
+          <a:p>
+            <a:r>
+              <a:t>இ) புரதங்களை படியெடுத்தல்</a:t>
+            </a:r>
+          </a:p>
+          <a:p>
+            <a:r>
+              <a:t>ஈ) லிப்பிடு உற்பத்தி </a:t>
             </a:r>
           </a:p>
         </p:txBody>

</xml_diff>